<commit_message>
changed slide for ajp
</commit_message>
<xml_diff>
--- a/Project 1ajp.pptx
+++ b/Project 1ajp.pptx
@@ -5,12 +5,10 @@
     <p:sldMasterId id="2147483696" r:id="rId1"/>
   </p:sldMasterIdLst>
   <p:notesMasterIdLst>
-    <p:notesMasterId r:id="rId5"/>
+    <p:notesMasterId r:id="rId3"/>
   </p:notesMasterIdLst>
   <p:sldIdLst>
-    <p:sldId id="267" r:id="rId2"/>
-    <p:sldId id="276" r:id="rId3"/>
-    <p:sldId id="277" r:id="rId4"/>
+    <p:sldId id="277" r:id="rId2"/>
   </p:sldIdLst>
   <p:sldSz cx="12192000" cy="6858000"/>
   <p:notesSz cx="6858000" cy="9144000"/>
@@ -199,7 +197,7 @@
           <a:p>
             <a:fld id="{A5C20BB3-3CCB-4FE5-991B-82F6BCB48AF3}" type="datetimeFigureOut">
               <a:rPr lang="en-US" smtClean="0"/>
-              <a:t>8/4/2019</a:t>
+              <a:t>8/5/2019</a:t>
             </a:fld>
             <a:endParaRPr lang="en-US"/>
           </a:p>
@@ -561,144 +559,6 @@
               </a:rPr>
               <a:t> Notebook</a:t>
             </a:r>
-            <a:br>
-              <a:rPr lang="en-US" dirty="0"/>
-            </a:br>
-            <a:endParaRPr lang="en-US" dirty="0"/>
-          </a:p>
-        </p:txBody>
-      </p:sp>
-      <p:sp>
-        <p:nvSpPr>
-          <p:cNvPr id="4" name="Slide Number Placeholder 3"/>
-          <p:cNvSpPr>
-            <a:spLocks noGrp="1"/>
-          </p:cNvSpPr>
-          <p:nvPr>
-            <p:ph type="sldNum" sz="quarter" idx="10"/>
-          </p:nvPr>
-        </p:nvSpPr>
-        <p:spPr/>
-        <p:txBody>
-          <a:bodyPr/>
-          <a:lstStyle/>
-          <a:p>
-            <a:fld id="{E0746DE6-3336-457D-A091-FA20AC1C536E}" type="slidenum">
-              <a:rPr lang="en-US" smtClean="0"/>
-              <a:t>1</a:t>
-            </a:fld>
-            <a:endParaRPr lang="en-US"/>
-          </a:p>
-        </p:txBody>
-      </p:sp>
-    </p:spTree>
-    <p:extLst>
-      <p:ext uri="{BB962C8B-B14F-4D97-AF65-F5344CB8AC3E}">
-        <p14:creationId xmlns:p14="http://schemas.microsoft.com/office/powerpoint/2010/main" val="3343772376"/>
-      </p:ext>
-    </p:extLst>
-  </p:cSld>
-  <p:clrMapOvr>
-    <a:masterClrMapping/>
-  </p:clrMapOvr>
-</p:notes>
-</file>
-
-<file path=ppt/notesSlides/notesSlide2.xml><?xml version="1.0" encoding="utf-8"?>
-<p:notes xmlns:a="http://schemas.openxmlformats.org/drawingml/2006/main" xmlns:r="http://schemas.openxmlformats.org/officeDocument/2006/relationships" xmlns:p="http://schemas.openxmlformats.org/presentationml/2006/main">
-  <p:cSld>
-    <p:spTree>
-      <p:nvGrpSpPr>
-        <p:cNvPr id="1" name=""/>
-        <p:cNvGrpSpPr/>
-        <p:nvPr/>
-      </p:nvGrpSpPr>
-      <p:grpSpPr>
-        <a:xfrm>
-          <a:off x="0" y="0"/>
-          <a:ext cx="0" cy="0"/>
-          <a:chOff x="0" y="0"/>
-          <a:chExt cx="0" cy="0"/>
-        </a:xfrm>
-      </p:grpSpPr>
-      <p:sp>
-        <p:nvSpPr>
-          <p:cNvPr id="2" name="Slide Image Placeholder 1"/>
-          <p:cNvSpPr>
-            <a:spLocks noGrp="1" noRot="1" noChangeAspect="1"/>
-          </p:cNvSpPr>
-          <p:nvPr>
-            <p:ph type="sldImg"/>
-          </p:nvPr>
-        </p:nvSpPr>
-        <p:spPr/>
-      </p:sp>
-      <p:sp>
-        <p:nvSpPr>
-          <p:cNvPr id="3" name="Notes Placeholder 2"/>
-          <p:cNvSpPr>
-            <a:spLocks noGrp="1"/>
-          </p:cNvSpPr>
-          <p:nvPr>
-            <p:ph type="body" idx="1"/>
-          </p:nvPr>
-        </p:nvSpPr>
-        <p:spPr/>
-        <p:txBody>
-          <a:bodyPr/>
-          <a:lstStyle/>
-          <a:p>
-            <a:r>
-              <a:rPr lang="en-US" sz="1200" b="0" i="0" kern="1200" dirty="0">
-                <a:solidFill>
-                  <a:schemeClr val="tx1"/>
-                </a:solidFill>
-                <a:effectLst/>
-                <a:latin typeface="+mn-lt"/>
-                <a:ea typeface="+mn-ea"/>
-                <a:cs typeface="+mn-cs"/>
-              </a:rPr>
-              <a:t>Discuss the steps you took to analyze the data and answer each question you asked in your proposal</a:t>
-            </a:r>
-            <a:br>
-              <a:rPr lang="en-US" dirty="0"/>
-            </a:br>
-            <a:r>
-              <a:rPr lang="en-US" sz="1200" b="0" i="0" kern="1200" dirty="0">
-                <a:solidFill>
-                  <a:schemeClr val="tx1"/>
-                </a:solidFill>
-                <a:effectLst/>
-                <a:latin typeface="+mn-lt"/>
-                <a:ea typeface="+mn-ea"/>
-                <a:cs typeface="+mn-cs"/>
-              </a:rPr>
-              <a:t>Present and discuss interesting figures developed during analysis, ideally with the help of </a:t>
-            </a:r>
-            <a:r>
-              <a:rPr lang="en-US" sz="1200" b="0" i="0" kern="1200" dirty="0" err="1">
-                <a:solidFill>
-                  <a:schemeClr val="tx1"/>
-                </a:solidFill>
-                <a:effectLst/>
-                <a:latin typeface="+mn-lt"/>
-                <a:ea typeface="+mn-ea"/>
-                <a:cs typeface="+mn-cs"/>
-              </a:rPr>
-              <a:t>Jupyter</a:t>
-            </a:r>
-            <a:r>
-              <a:rPr lang="en-US" sz="1200" b="0" i="0" kern="1200" dirty="0">
-                <a:solidFill>
-                  <a:schemeClr val="tx1"/>
-                </a:solidFill>
-                <a:effectLst/>
-                <a:latin typeface="+mn-lt"/>
-                <a:ea typeface="+mn-ea"/>
-                <a:cs typeface="+mn-cs"/>
-              </a:rPr>
-              <a:t> Notebook</a:t>
-            </a:r>
           </a:p>
           <a:p>
             <a:r>
@@ -740,162 +600,7 @@
           <a:p>
             <a:fld id="{E0746DE6-3336-457D-A091-FA20AC1C536E}" type="slidenum">
               <a:rPr lang="en-US" smtClean="0"/>
-              <a:t>2</a:t>
-            </a:fld>
-            <a:endParaRPr lang="en-US"/>
-          </a:p>
-        </p:txBody>
-      </p:sp>
-    </p:spTree>
-    <p:extLst>
-      <p:ext uri="{BB962C8B-B14F-4D97-AF65-F5344CB8AC3E}">
-        <p14:creationId xmlns:p14="http://schemas.microsoft.com/office/powerpoint/2010/main" val="2692281200"/>
-      </p:ext>
-    </p:extLst>
-  </p:cSld>
-  <p:clrMapOvr>
-    <a:masterClrMapping/>
-  </p:clrMapOvr>
-</p:notes>
-</file>
-
-<file path=ppt/notesSlides/notesSlide3.xml><?xml version="1.0" encoding="utf-8"?>
-<p:notes xmlns:a="http://schemas.openxmlformats.org/drawingml/2006/main" xmlns:r="http://schemas.openxmlformats.org/officeDocument/2006/relationships" xmlns:p="http://schemas.openxmlformats.org/presentationml/2006/main">
-  <p:cSld>
-    <p:spTree>
-      <p:nvGrpSpPr>
-        <p:cNvPr id="1" name=""/>
-        <p:cNvGrpSpPr/>
-        <p:nvPr/>
-      </p:nvGrpSpPr>
-      <p:grpSpPr>
-        <a:xfrm>
-          <a:off x="0" y="0"/>
-          <a:ext cx="0" cy="0"/>
-          <a:chOff x="0" y="0"/>
-          <a:chExt cx="0" cy="0"/>
-        </a:xfrm>
-      </p:grpSpPr>
-      <p:sp>
-        <p:nvSpPr>
-          <p:cNvPr id="2" name="Slide Image Placeholder 1"/>
-          <p:cNvSpPr>
-            <a:spLocks noGrp="1" noRot="1" noChangeAspect="1"/>
-          </p:cNvSpPr>
-          <p:nvPr>
-            <p:ph type="sldImg"/>
-          </p:nvPr>
-        </p:nvSpPr>
-        <p:spPr/>
-      </p:sp>
-      <p:sp>
-        <p:nvSpPr>
-          <p:cNvPr id="3" name="Notes Placeholder 2"/>
-          <p:cNvSpPr>
-            <a:spLocks noGrp="1"/>
-          </p:cNvSpPr>
-          <p:nvPr>
-            <p:ph type="body" idx="1"/>
-          </p:nvPr>
-        </p:nvSpPr>
-        <p:spPr/>
-        <p:txBody>
-          <a:bodyPr/>
-          <a:lstStyle/>
-          <a:p>
-            <a:r>
-              <a:rPr lang="en-US" sz="1200" b="0" i="0" kern="1200" dirty="0">
-                <a:solidFill>
-                  <a:schemeClr val="tx1"/>
-                </a:solidFill>
-                <a:effectLst/>
-                <a:latin typeface="+mn-lt"/>
-                <a:ea typeface="+mn-ea"/>
-                <a:cs typeface="+mn-cs"/>
-              </a:rPr>
-              <a:t>Discuss the steps you took to analyze the data and answer each question you asked in your proposal</a:t>
-            </a:r>
-            <a:br>
-              <a:rPr lang="en-US" dirty="0"/>
-            </a:br>
-            <a:r>
-              <a:rPr lang="en-US" sz="1200" b="0" i="0" kern="1200" dirty="0">
-                <a:solidFill>
-                  <a:schemeClr val="tx1"/>
-                </a:solidFill>
-                <a:effectLst/>
-                <a:latin typeface="+mn-lt"/>
-                <a:ea typeface="+mn-ea"/>
-                <a:cs typeface="+mn-cs"/>
-              </a:rPr>
-              <a:t>Present and discuss interesting figures developed during analysis, ideally with the help of </a:t>
-            </a:r>
-            <a:r>
-              <a:rPr lang="en-US" sz="1200" b="0" i="0" kern="1200" dirty="0" err="1">
-                <a:solidFill>
-                  <a:schemeClr val="tx1"/>
-                </a:solidFill>
-                <a:effectLst/>
-                <a:latin typeface="+mn-lt"/>
-                <a:ea typeface="+mn-ea"/>
-                <a:cs typeface="+mn-cs"/>
-              </a:rPr>
-              <a:t>Jupyter</a:t>
-            </a:r>
-            <a:r>
-              <a:rPr lang="en-US" sz="1200" b="0" i="0" kern="1200" dirty="0">
-                <a:solidFill>
-                  <a:schemeClr val="tx1"/>
-                </a:solidFill>
-                <a:effectLst/>
-                <a:latin typeface="+mn-lt"/>
-                <a:ea typeface="+mn-ea"/>
-                <a:cs typeface="+mn-cs"/>
-              </a:rPr>
-              <a:t> Notebook</a:t>
-            </a:r>
-          </a:p>
-          <a:p>
-            <a:r>
-              <a:rPr lang="en-US" sz="1200" b="0" i="0" kern="1200" dirty="0">
-                <a:solidFill>
-                  <a:schemeClr val="tx1"/>
-                </a:solidFill>
-                <a:effectLst/>
-                <a:latin typeface="+mn-lt"/>
-                <a:ea typeface="+mn-ea"/>
-                <a:cs typeface="+mn-cs"/>
-              </a:rPr>
-              <a:t>Discuss your findings. Did you find what you expected to find? If not, why not? What inferences or general conclusions can you draw from your analysis?</a:t>
-            </a:r>
-            <a:br>
-              <a:rPr lang="en-US" dirty="0"/>
-            </a:br>
-            <a:endParaRPr lang="en-US" dirty="0"/>
-          </a:p>
-          <a:p>
-            <a:endParaRPr lang="en-US" dirty="0"/>
-          </a:p>
-        </p:txBody>
-      </p:sp>
-      <p:sp>
-        <p:nvSpPr>
-          <p:cNvPr id="4" name="Slide Number Placeholder 3"/>
-          <p:cNvSpPr>
-            <a:spLocks noGrp="1"/>
-          </p:cNvSpPr>
-          <p:nvPr>
-            <p:ph type="sldNum" sz="quarter" idx="10"/>
-          </p:nvPr>
-        </p:nvSpPr>
-        <p:spPr/>
-        <p:txBody>
-          <a:bodyPr/>
-          <a:lstStyle/>
-          <a:p>
-            <a:fld id="{E0746DE6-3336-457D-A091-FA20AC1C536E}" type="slidenum">
-              <a:rPr lang="en-US" smtClean="0"/>
-              <a:t>3</a:t>
+              <a:t>1</a:t>
             </a:fld>
             <a:endParaRPr lang="en-US"/>
           </a:p>
@@ -1077,7 +782,7 @@
           <a:p>
             <a:fld id="{1160EA64-D806-43AC-9DF2-F8C432F32B4C}" type="datetimeFigureOut">
               <a:rPr lang="en-US" dirty="0"/>
-              <a:t>8/4/2019</a:t>
+              <a:t>8/5/2019</a:t>
             </a:fld>
             <a:endParaRPr lang="en-US" dirty="0"/>
           </a:p>
@@ -1248,7 +953,7 @@
           <a:p>
             <a:fld id="{E9F9C37B-1D36-470B-8223-D6C91242EC14}" type="datetimeFigureOut">
               <a:rPr lang="en-US" dirty="0"/>
-              <a:t>8/4/2019</a:t>
+              <a:t>8/5/2019</a:t>
             </a:fld>
             <a:endParaRPr lang="en-US" dirty="0"/>
           </a:p>
@@ -1428,7 +1133,7 @@
           <a:p>
             <a:fld id="{67C6F52A-A82B-47A2-A83A-8C4C91F2D59F}" type="datetimeFigureOut">
               <a:rPr lang="en-US" dirty="0"/>
-              <a:t>8/4/2019</a:t>
+              <a:t>8/5/2019</a:t>
             </a:fld>
             <a:endParaRPr lang="en-US" dirty="0"/>
           </a:p>
@@ -1598,7 +1303,7 @@
           <a:p>
             <a:fld id="{F070A7B3-6521-4DCA-87E5-044747A908C1}" type="datetimeFigureOut">
               <a:rPr lang="en-US" dirty="0"/>
-              <a:t>8/4/2019</a:t>
+              <a:t>8/5/2019</a:t>
             </a:fld>
             <a:endParaRPr lang="en-US" dirty="0"/>
           </a:p>
@@ -1867,7 +1572,7 @@
           <a:p>
             <a:fld id="{1160EA64-D806-43AC-9DF2-F8C432F32B4C}" type="datetimeFigureOut">
               <a:rPr lang="en-US" dirty="0"/>
-              <a:t>8/4/2019</a:t>
+              <a:t>8/5/2019</a:t>
             </a:fld>
             <a:endParaRPr lang="en-US" dirty="0"/>
           </a:p>
@@ -2100,7 +1805,7 @@
           <a:p>
             <a:fld id="{AB134690-1557-4C89-A502-4959FE7FAD70}" type="datetimeFigureOut">
               <a:rPr lang="en-US" dirty="0"/>
-              <a:t>8/4/2019</a:t>
+              <a:t>8/5/2019</a:t>
             </a:fld>
             <a:endParaRPr lang="en-US" dirty="0"/>
           </a:p>
@@ -2459,7 +2164,7 @@
           <a:p>
             <a:fld id="{4F7D4976-E339-4826-83B7-FBD03F55ECF8}" type="datetimeFigureOut">
               <a:rPr lang="en-US" dirty="0"/>
-              <a:t>8/4/2019</a:t>
+              <a:t>8/5/2019</a:t>
             </a:fld>
             <a:endParaRPr lang="en-US" dirty="0"/>
           </a:p>
@@ -2600,7 +2305,7 @@
           <a:p>
             <a:fld id="{E1037C31-9E7A-4F99-8774-A0E530DE1A42}" type="datetimeFigureOut">
               <a:rPr lang="en-US" dirty="0"/>
-              <a:t>8/4/2019</a:t>
+              <a:t>8/5/2019</a:t>
             </a:fld>
             <a:endParaRPr lang="en-US" dirty="0"/>
           </a:p>
@@ -2695,7 +2400,7 @@
           <a:p>
             <a:fld id="{C278504F-A551-4DE0-9316-4DCD1D8CC752}" type="datetimeFigureOut">
               <a:rPr lang="en-US" dirty="0"/>
-              <a:t>8/4/2019</a:t>
+              <a:t>8/5/2019</a:t>
             </a:fld>
             <a:endParaRPr lang="en-US" dirty="0"/>
           </a:p>
@@ -3052,7 +2757,7 @@
           <a:p>
             <a:fld id="{D1BE4249-C0D0-4B06-8692-E8BB871AF643}" type="datetimeFigureOut">
               <a:rPr lang="en-US" dirty="0"/>
-              <a:t>8/4/2019</a:t>
+              <a:t>8/5/2019</a:t>
             </a:fld>
             <a:endParaRPr lang="en-US" dirty="0"/>
           </a:p>
@@ -3409,7 +3114,7 @@
           <a:p>
             <a:fld id="{042B0DB6-F5C7-45FB-8CF3-31B45F9C2DAC}" type="datetimeFigureOut">
               <a:rPr lang="en-US" dirty="0"/>
-              <a:t>8/4/2019</a:t>
+              <a:t>8/5/2019</a:t>
             </a:fld>
             <a:endParaRPr lang="en-US" dirty="0"/>
           </a:p>
@@ -3651,7 +3356,7 @@
           <a:p>
             <a:fld id="{1160EA64-D806-43AC-9DF2-F8C432F32B4C}" type="datetimeFigureOut">
               <a:rPr lang="en-US" dirty="0"/>
-              <a:t>8/4/2019</a:t>
+              <a:t>8/5/2019</a:t>
             </a:fld>
             <a:endParaRPr lang="en-US" dirty="0"/>
           </a:p>
@@ -4248,404 +3953,6 @@
         </p:nvSpPr>
         <p:spPr>
           <a:xfrm>
-            <a:off x="643467" y="643467"/>
-            <a:ext cx="3363974" cy="1728044"/>
-          </a:xfrm>
-          <a:noFill/>
-          <a:ln>
-            <a:solidFill>
-              <a:schemeClr val="bg1"/>
-            </a:solidFill>
-          </a:ln>
-        </p:spPr>
-        <p:txBody>
-          <a:bodyPr wrap="square">
-            <a:normAutofit fontScale="90000"/>
-          </a:bodyPr>
-          <a:lstStyle/>
-          <a:p>
-            <a:r>
-              <a:rPr lang="en-US" dirty="0">
-                <a:solidFill>
-                  <a:schemeClr val="bg1"/>
-                </a:solidFill>
-              </a:rPr>
-              <a:t>Energy capacity</a:t>
-            </a:r>
-            <a:br>
-              <a:rPr lang="en-US" dirty="0">
-                <a:solidFill>
-                  <a:schemeClr val="bg1"/>
-                </a:solidFill>
-              </a:rPr>
-            </a:br>
-            <a:r>
-              <a:rPr lang="en-US" dirty="0">
-                <a:solidFill>
-                  <a:schemeClr val="bg1"/>
-                </a:solidFill>
-              </a:rPr>
-              <a:t>Where are we building?</a:t>
-            </a:r>
-          </a:p>
-        </p:txBody>
-      </p:sp>
-      <p:sp>
-        <p:nvSpPr>
-          <p:cNvPr id="3" name="Content Placeholder 2"/>
-          <p:cNvSpPr>
-            <a:spLocks noGrp="1"/>
-          </p:cNvSpPr>
-          <p:nvPr>
-            <p:ph idx="1"/>
-          </p:nvPr>
-        </p:nvSpPr>
-        <p:spPr>
-          <a:xfrm>
-            <a:off x="346841" y="2629057"/>
-            <a:ext cx="3962400" cy="3415622"/>
-          </a:xfrm>
-        </p:spPr>
-        <p:txBody>
-          <a:bodyPr>
-            <a:normAutofit/>
-          </a:bodyPr>
-          <a:lstStyle/>
-          <a:p>
-            <a:pPr marL="0" indent="0" algn="ctr">
-              <a:buNone/>
-            </a:pPr>
-            <a:r>
-              <a:rPr lang="en-US" dirty="0">
-                <a:solidFill>
-                  <a:schemeClr val="bg1"/>
-                </a:solidFill>
-              </a:rPr>
-              <a:t>Maximum energy production capability calculated from power plant commissioning of all fuel types</a:t>
-            </a:r>
-          </a:p>
-          <a:p>
-            <a:pPr marL="0" indent="0" algn="ctr">
-              <a:buNone/>
-            </a:pPr>
-            <a:r>
-              <a:rPr lang="en-US" dirty="0">
-                <a:solidFill>
-                  <a:schemeClr val="bg1"/>
-                </a:solidFill>
-              </a:rPr>
-              <a:t>Source:</a:t>
-            </a:r>
-            <a:br>
-              <a:rPr lang="en-US" dirty="0">
-                <a:solidFill>
-                  <a:schemeClr val="bg1"/>
-                </a:solidFill>
-              </a:rPr>
-            </a:br>
-            <a:r>
-              <a:rPr lang="en-US" dirty="0">
-                <a:solidFill>
-                  <a:schemeClr val="bg1"/>
-                </a:solidFill>
-              </a:rPr>
-              <a:t>Global Power Plant Database</a:t>
-            </a:r>
-          </a:p>
-        </p:txBody>
-      </p:sp>
-      <p:pic>
-        <p:nvPicPr>
-          <p:cNvPr id="9" name="Picture 2" descr="https://www.challenge.ma/wp-content/uploads/2017/03/Noor-2.jpg">
-            <a:extLst>
-              <a:ext uri="{FF2B5EF4-FFF2-40B4-BE49-F238E27FC236}">
-                <a16:creationId xmlns:a16="http://schemas.microsoft.com/office/drawing/2014/main" id="{FD29FDC2-3A19-4202-BAB7-E4A838BA4186}"/>
-              </a:ext>
-            </a:extLst>
-          </p:cNvPr>
-          <p:cNvPicPr>
-            <a:picLocks noChangeAspect="1" noChangeArrowheads="1"/>
-          </p:cNvPicPr>
-          <p:nvPr/>
-        </p:nvPicPr>
-        <p:blipFill rotWithShape="1">
-          <a:blip r:embed="rId3">
-            <a:extLst>
-              <a:ext uri="{28A0092B-C50C-407E-A947-70E740481C1C}">
-                <a14:useLocalDpi xmlns:a14="http://schemas.microsoft.com/office/drawing/2010/main" val="0"/>
-              </a:ext>
-            </a:extLst>
-          </a:blip>
-          <a:srcRect r="35068"/>
-          <a:stretch/>
-        </p:blipFill>
-        <p:spPr bwMode="auto">
-          <a:xfrm>
-            <a:off x="161678" y="4625449"/>
-            <a:ext cx="1978321" cy="1787087"/>
-          </a:xfrm>
-          <a:prstGeom prst="rect">
-            <a:avLst/>
-          </a:prstGeom>
-          <a:noFill/>
-          <a:extLst>
-            <a:ext uri="{909E8E84-426E-40DD-AFC4-6F175D3DCCD1}">
-              <a14:hiddenFill xmlns:a14="http://schemas.microsoft.com/office/drawing/2010/main">
-                <a:solidFill>
-                  <a:srgbClr val="FFFFFF"/>
-                </a:solidFill>
-              </a14:hiddenFill>
-            </a:ext>
-          </a:extLst>
-        </p:spPr>
-      </p:pic>
-      <p:pic>
-        <p:nvPicPr>
-          <p:cNvPr id="6146" name="Picture 2" descr="Image result for power plant image">
-            <a:extLst>
-              <a:ext uri="{FF2B5EF4-FFF2-40B4-BE49-F238E27FC236}">
-                <a16:creationId xmlns:a16="http://schemas.microsoft.com/office/drawing/2014/main" id="{375340A0-0230-4553-9682-37394B44C3DB}"/>
-              </a:ext>
-            </a:extLst>
-          </p:cNvPr>
-          <p:cNvPicPr>
-            <a:picLocks noChangeAspect="1" noChangeArrowheads="1"/>
-          </p:cNvPicPr>
-          <p:nvPr/>
-        </p:nvPicPr>
-        <p:blipFill rotWithShape="1">
-          <a:blip r:embed="rId4">
-            <a:extLst>
-              <a:ext uri="{28A0092B-C50C-407E-A947-70E740481C1C}">
-                <a14:useLocalDpi xmlns:a14="http://schemas.microsoft.com/office/drawing/2010/main" val="0"/>
-              </a:ext>
-            </a:extLst>
-          </a:blip>
-          <a:srcRect l="15788"/>
-          <a:stretch/>
-        </p:blipFill>
-        <p:spPr bwMode="auto">
-          <a:xfrm>
-            <a:off x="2325454" y="4625448"/>
-            <a:ext cx="2163776" cy="1787087"/>
-          </a:xfrm>
-          <a:prstGeom prst="rect">
-            <a:avLst/>
-          </a:prstGeom>
-          <a:noFill/>
-          <a:extLst>
-            <a:ext uri="{909E8E84-426E-40DD-AFC4-6F175D3DCCD1}">
-              <a14:hiddenFill xmlns:a14="http://schemas.microsoft.com/office/drawing/2010/main">
-                <a:solidFill>
-                  <a:srgbClr val="FFFFFF"/>
-                </a:solidFill>
-              </a14:hiddenFill>
-            </a:ext>
-          </a:extLst>
-        </p:spPr>
-      </p:pic>
-      <p:pic>
-        <p:nvPicPr>
-          <p:cNvPr id="4" name="Picture 3">
-            <a:extLst>
-              <a:ext uri="{FF2B5EF4-FFF2-40B4-BE49-F238E27FC236}">
-                <a16:creationId xmlns:a16="http://schemas.microsoft.com/office/drawing/2014/main" id="{18E71770-59DF-4B0B-A9DA-2394B92772D1}"/>
-              </a:ext>
-            </a:extLst>
-          </p:cNvPr>
-          <p:cNvPicPr>
-            <a:picLocks noChangeAspect="1"/>
-          </p:cNvPicPr>
-          <p:nvPr/>
-        </p:nvPicPr>
-        <p:blipFill rotWithShape="1">
-          <a:blip r:embed="rId5"/>
-          <a:srcRect l="12072" t="20921" r="20076" b="6191"/>
-          <a:stretch/>
-        </p:blipFill>
-        <p:spPr>
-          <a:xfrm>
-            <a:off x="5001137" y="1168984"/>
-            <a:ext cx="6845021" cy="4149250"/>
-          </a:xfrm>
-          <a:prstGeom prst="rect">
-            <a:avLst/>
-          </a:prstGeom>
-        </p:spPr>
-      </p:pic>
-    </p:spTree>
-    <p:extLst>
-      <p:ext uri="{BB962C8B-B14F-4D97-AF65-F5344CB8AC3E}">
-        <p14:creationId xmlns:p14="http://schemas.microsoft.com/office/powerpoint/2010/main" val="3387975780"/>
-      </p:ext>
-    </p:extLst>
-  </p:cSld>
-  <p:clrMapOvr>
-    <a:masterClrMapping/>
-  </p:clrMapOvr>
-</p:sld>
-</file>
-
-<file path=ppt/slides/slide2.xml><?xml version="1.0" encoding="utf-8"?>
-<p:sld xmlns:a="http://schemas.openxmlformats.org/drawingml/2006/main" xmlns:r="http://schemas.openxmlformats.org/officeDocument/2006/relationships" xmlns:p="http://schemas.openxmlformats.org/presentationml/2006/main">
-  <p:cSld>
-    <p:bg>
-      <p:bgPr>
-        <a:solidFill>
-          <a:schemeClr val="bg1">
-            <a:lumMod val="95000"/>
-          </a:schemeClr>
-        </a:solidFill>
-        <a:effectLst/>
-      </p:bgPr>
-    </p:bg>
-    <p:spTree>
-      <p:nvGrpSpPr>
-        <p:cNvPr id="1" name=""/>
-        <p:cNvGrpSpPr/>
-        <p:nvPr/>
-      </p:nvGrpSpPr>
-      <p:grpSpPr>
-        <a:xfrm>
-          <a:off x="0" y="0"/>
-          <a:ext cx="0" cy="0"/>
-          <a:chOff x="0" y="0"/>
-          <a:chExt cx="0" cy="0"/>
-        </a:xfrm>
-      </p:grpSpPr>
-      <p:sp useBgFill="1">
-        <p:nvSpPr>
-          <p:cNvPr id="11" name="Rectangle 10">
-            <a:extLst>
-              <a:ext uri="{FF2B5EF4-FFF2-40B4-BE49-F238E27FC236}">
-                <a16:creationId xmlns:a16="http://schemas.microsoft.com/office/drawing/2014/main" id="{1660E788-AFA9-4A1B-9991-6AA74632A15B}"/>
-              </a:ext>
-              <a:ext uri="{C183D7F6-B498-43B3-948B-1728B52AA6E4}">
-                <adec:decorative xmlns:adec="http://schemas.microsoft.com/office/drawing/2017/decorative" val="1"/>
-              </a:ext>
-            </a:extLst>
-          </p:cNvPr>
-          <p:cNvSpPr>
-            <a:spLocks noGrp="1" noRot="1" noChangeAspect="1" noMove="1" noResize="1" noEditPoints="1" noAdjustHandles="1" noChangeArrowheads="1" noChangeShapeType="1" noTextEdit="1"/>
-          </p:cNvSpPr>
-          <p:nvPr>
-            <p:extLst>
-              <p:ext uri="{386F3935-93C4-4BCD-93E2-E3B085C9AB24}">
-                <p16:designElem xmlns:p16="http://schemas.microsoft.com/office/powerpoint/2015/main" val="1"/>
-              </p:ext>
-            </p:extLst>
-          </p:nvPr>
-        </p:nvSpPr>
-        <p:spPr>
-          <a:xfrm>
-            <a:off x="0" y="0"/>
-            <a:ext cx="12191999" cy="6858000"/>
-          </a:xfrm>
-          <a:prstGeom prst="rect">
-            <a:avLst/>
-          </a:prstGeom>
-          <a:ln>
-            <a:noFill/>
-          </a:ln>
-        </p:spPr>
-        <p:style>
-          <a:lnRef idx="2">
-            <a:schemeClr val="accent1">
-              <a:shade val="50000"/>
-            </a:schemeClr>
-          </a:lnRef>
-          <a:fillRef idx="1">
-            <a:schemeClr val="accent1"/>
-          </a:fillRef>
-          <a:effectRef idx="0">
-            <a:schemeClr val="accent1"/>
-          </a:effectRef>
-          <a:fontRef idx="minor">
-            <a:schemeClr val="lt1"/>
-          </a:fontRef>
-        </p:style>
-        <p:txBody>
-          <a:bodyPr rtlCol="0" anchor="ctr"/>
-          <a:lstStyle/>
-          <a:p>
-            <a:pPr algn="ctr"/>
-            <a:endParaRPr lang="en-US"/>
-          </a:p>
-        </p:txBody>
-      </p:sp>
-      <p:sp>
-        <p:nvSpPr>
-          <p:cNvPr id="13" name="Rectangle 12">
-            <a:extLst>
-              <a:ext uri="{FF2B5EF4-FFF2-40B4-BE49-F238E27FC236}">
-                <a16:creationId xmlns:a16="http://schemas.microsoft.com/office/drawing/2014/main" id="{867D4867-5BA7-4462-B2F6-A23F4A622AA7}"/>
-              </a:ext>
-              <a:ext uri="{C183D7F6-B498-43B3-948B-1728B52AA6E4}">
-                <adec:decorative xmlns:adec="http://schemas.microsoft.com/office/drawing/2017/decorative" val="1"/>
-              </a:ext>
-            </a:extLst>
-          </p:cNvPr>
-          <p:cNvSpPr>
-            <a:spLocks noGrp="1" noRot="1" noChangeAspect="1" noMove="1" noResize="1" noEditPoints="1" noAdjustHandles="1" noChangeArrowheads="1" noChangeShapeType="1" noTextEdit="1"/>
-          </p:cNvSpPr>
-          <p:nvPr>
-            <p:extLst>
-              <p:ext uri="{386F3935-93C4-4BCD-93E2-E3B085C9AB24}">
-                <p16:designElem xmlns:p16="http://schemas.microsoft.com/office/powerpoint/2015/main" val="1"/>
-              </p:ext>
-            </p:extLst>
-          </p:nvPr>
-        </p:nvSpPr>
-        <p:spPr>
-          <a:xfrm>
-            <a:off x="0" y="0"/>
-            <a:ext cx="4654296" cy="6858000"/>
-          </a:xfrm>
-          <a:prstGeom prst="rect">
-            <a:avLst/>
-          </a:prstGeom>
-          <a:solidFill>
-            <a:schemeClr val="tx2"/>
-          </a:solidFill>
-          <a:ln>
-            <a:noFill/>
-          </a:ln>
-        </p:spPr>
-        <p:style>
-          <a:lnRef idx="0">
-            <a:scrgbClr r="0" g="0" b="0"/>
-          </a:lnRef>
-          <a:fillRef idx="0">
-            <a:scrgbClr r="0" g="0" b="0"/>
-          </a:fillRef>
-          <a:effectRef idx="0">
-            <a:scrgbClr r="0" g="0" b="0"/>
-          </a:effectRef>
-          <a:fontRef idx="minor">
-            <a:schemeClr val="lt1"/>
-          </a:fontRef>
-        </p:style>
-        <p:txBody>
-          <a:bodyPr rtlCol="0" anchor="ctr"/>
-          <a:lstStyle/>
-          <a:p>
-            <a:pPr algn="ctr"/>
-            <a:endParaRPr lang="en-US"/>
-          </a:p>
-        </p:txBody>
-      </p:sp>
-      <p:sp>
-        <p:nvSpPr>
-          <p:cNvPr id="2" name="Title 1"/>
-          <p:cNvSpPr>
-            <a:spLocks noGrp="1"/>
-          </p:cNvSpPr>
-          <p:nvPr>
-            <p:ph type="title"/>
-          </p:nvPr>
-        </p:nvSpPr>
-        <p:spPr>
-          <a:xfrm>
             <a:off x="645161" y="253516"/>
             <a:ext cx="3363974" cy="1728044"/>
           </a:xfrm>
@@ -4668,23 +3975,7 @@
                   <a:schemeClr val="bg1"/>
                 </a:solidFill>
               </a:rPr>
-              <a:t>How does </a:t>
-            </a:r>
-            <a:r>
-              <a:rPr lang="en-US" dirty="0" err="1">
-                <a:solidFill>
-                  <a:schemeClr val="bg1"/>
-                </a:solidFill>
-              </a:rPr>
-              <a:t>hdi</a:t>
-            </a:r>
-            <a:r>
-              <a:rPr lang="en-US" dirty="0">
-                <a:solidFill>
-                  <a:schemeClr val="bg1"/>
-                </a:solidFill>
-              </a:rPr>
-              <a:t> look with add capacity and generation?</a:t>
+              <a:t>How much more generation when capacity is added</a:t>
             </a:r>
           </a:p>
         </p:txBody>
@@ -4785,7 +4076,7 @@
         <p:spPr>
           <a:xfrm>
             <a:off x="5435284" y="698578"/>
-            <a:ext cx="6184918" cy="369332"/>
+            <a:ext cx="6184918" cy="923330"/>
           </a:xfrm>
           <a:prstGeom prst="rect">
             <a:avLst/>
@@ -4800,298 +4091,17 @@
           <a:p>
             <a:r>
               <a:rPr lang="en-US" dirty="0"/>
-              <a:t>Let’s take a look at some graphs!</a:t>
-            </a:r>
-          </a:p>
-        </p:txBody>
-      </p:sp>
-    </p:spTree>
-    <p:extLst>
-      <p:ext uri="{BB962C8B-B14F-4D97-AF65-F5344CB8AC3E}">
-        <p14:creationId xmlns:p14="http://schemas.microsoft.com/office/powerpoint/2010/main" val="2512149050"/>
-      </p:ext>
-    </p:extLst>
-  </p:cSld>
-  <p:clrMapOvr>
-    <a:masterClrMapping/>
-  </p:clrMapOvr>
-</p:sld>
-</file>
-
-<file path=ppt/slides/slide3.xml><?xml version="1.0" encoding="utf-8"?>
-<p:sld xmlns:a="http://schemas.openxmlformats.org/drawingml/2006/main" xmlns:r="http://schemas.openxmlformats.org/officeDocument/2006/relationships" xmlns:p="http://schemas.openxmlformats.org/presentationml/2006/main">
-  <p:cSld>
-    <p:bg>
-      <p:bgPr>
-        <a:solidFill>
-          <a:schemeClr val="bg1">
-            <a:lumMod val="95000"/>
-          </a:schemeClr>
-        </a:solidFill>
-        <a:effectLst/>
-      </p:bgPr>
-    </p:bg>
-    <p:spTree>
-      <p:nvGrpSpPr>
-        <p:cNvPr id="1" name=""/>
-        <p:cNvGrpSpPr/>
-        <p:nvPr/>
-      </p:nvGrpSpPr>
-      <p:grpSpPr>
-        <a:xfrm>
-          <a:off x="0" y="0"/>
-          <a:ext cx="0" cy="0"/>
-          <a:chOff x="0" y="0"/>
-          <a:chExt cx="0" cy="0"/>
-        </a:xfrm>
-      </p:grpSpPr>
-      <p:sp useBgFill="1">
-        <p:nvSpPr>
-          <p:cNvPr id="11" name="Rectangle 10">
+              <a:t>A linear regression reveals the for every MW added to capacity a countries generation/consumption increases by 0.40 MWh. In other words about 40% of added capacity is used.</a:t>
+            </a:r>
+          </a:p>
+        </p:txBody>
+      </p:sp>
+      <p:pic>
+        <p:nvPicPr>
+          <p:cNvPr id="7" name="Picture 6">
             <a:extLst>
               <a:ext uri="{FF2B5EF4-FFF2-40B4-BE49-F238E27FC236}">
-                <a16:creationId xmlns:a16="http://schemas.microsoft.com/office/drawing/2014/main" id="{1660E788-AFA9-4A1B-9991-6AA74632A15B}"/>
-              </a:ext>
-              <a:ext uri="{C183D7F6-B498-43B3-948B-1728B52AA6E4}">
-                <adec:decorative xmlns:adec="http://schemas.microsoft.com/office/drawing/2017/decorative" val="1"/>
-              </a:ext>
-            </a:extLst>
-          </p:cNvPr>
-          <p:cNvSpPr>
-            <a:spLocks noGrp="1" noRot="1" noChangeAspect="1" noMove="1" noResize="1" noEditPoints="1" noAdjustHandles="1" noChangeArrowheads="1" noChangeShapeType="1" noTextEdit="1"/>
-          </p:cNvSpPr>
-          <p:nvPr>
-            <p:extLst>
-              <p:ext uri="{386F3935-93C4-4BCD-93E2-E3B085C9AB24}">
-                <p16:designElem xmlns:p16="http://schemas.microsoft.com/office/powerpoint/2015/main" val="1"/>
-              </p:ext>
-            </p:extLst>
-          </p:nvPr>
-        </p:nvSpPr>
-        <p:spPr>
-          <a:xfrm>
-            <a:off x="0" y="0"/>
-            <a:ext cx="12191999" cy="6858000"/>
-          </a:xfrm>
-          <a:prstGeom prst="rect">
-            <a:avLst/>
-          </a:prstGeom>
-          <a:ln>
-            <a:noFill/>
-          </a:ln>
-        </p:spPr>
-        <p:style>
-          <a:lnRef idx="2">
-            <a:schemeClr val="accent1">
-              <a:shade val="50000"/>
-            </a:schemeClr>
-          </a:lnRef>
-          <a:fillRef idx="1">
-            <a:schemeClr val="accent1"/>
-          </a:fillRef>
-          <a:effectRef idx="0">
-            <a:schemeClr val="accent1"/>
-          </a:effectRef>
-          <a:fontRef idx="minor">
-            <a:schemeClr val="lt1"/>
-          </a:fontRef>
-        </p:style>
-        <p:txBody>
-          <a:bodyPr rtlCol="0" anchor="ctr"/>
-          <a:lstStyle/>
-          <a:p>
-            <a:pPr algn="ctr"/>
-            <a:endParaRPr lang="en-US"/>
-          </a:p>
-        </p:txBody>
-      </p:sp>
-      <p:sp>
-        <p:nvSpPr>
-          <p:cNvPr id="13" name="Rectangle 12">
-            <a:extLst>
-              <a:ext uri="{FF2B5EF4-FFF2-40B4-BE49-F238E27FC236}">
-                <a16:creationId xmlns:a16="http://schemas.microsoft.com/office/drawing/2014/main" id="{867D4867-5BA7-4462-B2F6-A23F4A622AA7}"/>
-              </a:ext>
-              <a:ext uri="{C183D7F6-B498-43B3-948B-1728B52AA6E4}">
-                <adec:decorative xmlns:adec="http://schemas.microsoft.com/office/drawing/2017/decorative" val="1"/>
-              </a:ext>
-            </a:extLst>
-          </p:cNvPr>
-          <p:cNvSpPr>
-            <a:spLocks noGrp="1" noRot="1" noChangeAspect="1" noMove="1" noResize="1" noEditPoints="1" noAdjustHandles="1" noChangeArrowheads="1" noChangeShapeType="1" noTextEdit="1"/>
-          </p:cNvSpPr>
-          <p:nvPr>
-            <p:extLst>
-              <p:ext uri="{386F3935-93C4-4BCD-93E2-E3B085C9AB24}">
-                <p16:designElem xmlns:p16="http://schemas.microsoft.com/office/powerpoint/2015/main" val="1"/>
-              </p:ext>
-            </p:extLst>
-          </p:nvPr>
-        </p:nvSpPr>
-        <p:spPr>
-          <a:xfrm>
-            <a:off x="0" y="0"/>
-            <a:ext cx="4654296" cy="6858000"/>
-          </a:xfrm>
-          <a:prstGeom prst="rect">
-            <a:avLst/>
-          </a:prstGeom>
-          <a:solidFill>
-            <a:schemeClr val="tx2"/>
-          </a:solidFill>
-          <a:ln>
-            <a:noFill/>
-          </a:ln>
-        </p:spPr>
-        <p:style>
-          <a:lnRef idx="0">
-            <a:scrgbClr r="0" g="0" b="0"/>
-          </a:lnRef>
-          <a:fillRef idx="0">
-            <a:scrgbClr r="0" g="0" b="0"/>
-          </a:fillRef>
-          <a:effectRef idx="0">
-            <a:scrgbClr r="0" g="0" b="0"/>
-          </a:effectRef>
-          <a:fontRef idx="minor">
-            <a:schemeClr val="lt1"/>
-          </a:fontRef>
-        </p:style>
-        <p:txBody>
-          <a:bodyPr rtlCol="0" anchor="ctr"/>
-          <a:lstStyle/>
-          <a:p>
-            <a:pPr algn="ctr"/>
-            <a:endParaRPr lang="en-US"/>
-          </a:p>
-        </p:txBody>
-      </p:sp>
-      <p:sp>
-        <p:nvSpPr>
-          <p:cNvPr id="2" name="Title 1"/>
-          <p:cNvSpPr>
-            <a:spLocks noGrp="1"/>
-          </p:cNvSpPr>
-          <p:nvPr>
-            <p:ph type="title"/>
-          </p:nvPr>
-        </p:nvSpPr>
-        <p:spPr>
-          <a:xfrm>
-            <a:off x="645161" y="253516"/>
-            <a:ext cx="3363974" cy="1728044"/>
-          </a:xfrm>
-          <a:noFill/>
-          <a:ln>
-            <a:solidFill>
-              <a:schemeClr val="bg1"/>
-            </a:solidFill>
-          </a:ln>
-        </p:spPr>
-        <p:txBody>
-          <a:bodyPr wrap="square">
-            <a:normAutofit fontScale="90000"/>
-          </a:bodyPr>
-          <a:lstStyle/>
-          <a:p>
-            <a:r>
-              <a:rPr lang="en-US" dirty="0">
-                <a:solidFill>
-                  <a:schemeClr val="bg1"/>
-                </a:solidFill>
-              </a:rPr>
-              <a:t>How much more generation when capacity is added</a:t>
-            </a:r>
-          </a:p>
-        </p:txBody>
-      </p:sp>
-      <p:sp>
-        <p:nvSpPr>
-          <p:cNvPr id="3" name="Content Placeholder 2"/>
-          <p:cNvSpPr>
-            <a:spLocks noGrp="1"/>
-          </p:cNvSpPr>
-          <p:nvPr>
-            <p:ph idx="1"/>
-          </p:nvPr>
-        </p:nvSpPr>
-        <p:spPr>
-          <a:xfrm>
-            <a:off x="185432" y="2076159"/>
-            <a:ext cx="4298730" cy="3415622"/>
-          </a:xfrm>
-        </p:spPr>
-        <p:txBody>
-          <a:bodyPr>
-            <a:normAutofit/>
-          </a:bodyPr>
-          <a:lstStyle/>
-          <a:p>
-            <a:pPr marL="0" indent="0" algn="ctr">
-              <a:buNone/>
-            </a:pPr>
-            <a:r>
-              <a:rPr lang="en-US" dirty="0">
-                <a:solidFill>
-                  <a:schemeClr val="bg1"/>
-                </a:solidFill>
-              </a:rPr>
-              <a:t> How much of added capacity becomes more generation?</a:t>
-            </a:r>
-          </a:p>
-        </p:txBody>
-      </p:sp>
-      <p:pic>
-        <p:nvPicPr>
-          <p:cNvPr id="4098" name="Picture 2" descr="Image result for hDI images">
-            <a:extLst>
-              <a:ext uri="{FF2B5EF4-FFF2-40B4-BE49-F238E27FC236}">
-                <a16:creationId xmlns:a16="http://schemas.microsoft.com/office/drawing/2014/main" id="{ABCE68FF-32BB-400A-A394-46BB6AA87D3A}"/>
-              </a:ext>
-            </a:extLst>
-          </p:cNvPr>
-          <p:cNvPicPr>
-            <a:picLocks noChangeAspect="1" noChangeArrowheads="1"/>
-          </p:cNvPicPr>
-          <p:nvPr/>
-        </p:nvPicPr>
-        <p:blipFill rotWithShape="1">
-          <a:blip r:embed="rId3">
-            <a:extLst>
-              <a:ext uri="{28A0092B-C50C-407E-A947-70E740481C1C}">
-                <a14:useLocalDpi xmlns:a14="http://schemas.microsoft.com/office/drawing/2010/main" val="0"/>
-              </a:ext>
-            </a:extLst>
-          </a:blip>
-          <a:srcRect l="7455" t="4301" r="1821" b="7952"/>
-          <a:stretch/>
-        </p:blipFill>
-        <p:spPr bwMode="auto">
-          <a:xfrm>
-            <a:off x="830316" y="3794234"/>
-            <a:ext cx="3020733" cy="2921636"/>
-          </a:xfrm>
-          <a:prstGeom prst="rect">
-            <a:avLst/>
-          </a:prstGeom>
-          <a:noFill/>
-          <a:extLst>
-            <a:ext uri="{909E8E84-426E-40DD-AFC4-6F175D3DCCD1}">
-              <a14:hiddenFill xmlns:a14="http://schemas.microsoft.com/office/drawing/2010/main">
-                <a:solidFill>
-                  <a:srgbClr val="FFFFFF"/>
-                </a:solidFill>
-              </a14:hiddenFill>
-            </a:ext>
-          </a:extLst>
-        </p:spPr>
-      </p:pic>
-      <p:pic>
-        <p:nvPicPr>
-          <p:cNvPr id="5" name="Picture 4">
-            <a:extLst>
-              <a:ext uri="{FF2B5EF4-FFF2-40B4-BE49-F238E27FC236}">
-                <a16:creationId xmlns:a16="http://schemas.microsoft.com/office/drawing/2014/main" id="{EB0586E5-6087-4230-B2AD-A790A6CC772E}"/>
+                <a16:creationId xmlns:a16="http://schemas.microsoft.com/office/drawing/2014/main" id="{52D4B85A-6E96-45C5-9335-EEFD2DF93916}"/>
               </a:ext>
             </a:extLst>
           </p:cNvPr>
@@ -5108,49 +4118,14 @@
         </p:blipFill>
         <p:spPr>
           <a:xfrm>
-            <a:off x="5226092" y="2076159"/>
-            <a:ext cx="6394110" cy="4587054"/>
+            <a:off x="5129046" y="2127383"/>
+            <a:ext cx="6700803" cy="4395384"/>
           </a:xfrm>
           <a:prstGeom prst="rect">
             <a:avLst/>
           </a:prstGeom>
         </p:spPr>
       </p:pic>
-      <p:sp>
-        <p:nvSpPr>
-          <p:cNvPr id="6" name="TextBox 5">
-            <a:extLst>
-              <a:ext uri="{FF2B5EF4-FFF2-40B4-BE49-F238E27FC236}">
-                <a16:creationId xmlns:a16="http://schemas.microsoft.com/office/drawing/2014/main" id="{612B50AF-7167-414B-AA92-682F48F4697C}"/>
-              </a:ext>
-            </a:extLst>
-          </p:cNvPr>
-          <p:cNvSpPr txBox="1"/>
-          <p:nvPr/>
-        </p:nvSpPr>
-        <p:spPr>
-          <a:xfrm>
-            <a:off x="5435284" y="698578"/>
-            <a:ext cx="6184918" cy="923330"/>
-          </a:xfrm>
-          <a:prstGeom prst="rect">
-            <a:avLst/>
-          </a:prstGeom>
-          <a:noFill/>
-        </p:spPr>
-        <p:txBody>
-          <a:bodyPr wrap="square" rtlCol="0">
-            <a:spAutoFit/>
-          </a:bodyPr>
-          <a:lstStyle/>
-          <a:p>
-            <a:r>
-              <a:rPr lang="en-US" dirty="0"/>
-              <a:t>A linear regression reveals the for every MW added to capacity a countries generation/consumption increases by 0.40 MWh. In other words about 40% of added capacity is used.</a:t>
-            </a:r>
-          </a:p>
-        </p:txBody>
-      </p:sp>
     </p:spTree>
     <p:extLst>
       <p:ext uri="{BB962C8B-B14F-4D97-AF65-F5344CB8AC3E}">

</xml_diff>